<commit_message>
prova 3 de pc1
</commit_message>
<xml_diff>
--- a/aulas/pc1/AulaPython09-Arquivos.pptx
+++ b/aulas/pc1/AulaPython09-Arquivos.pptx
@@ -4674,7 +4674,7 @@
                 <a:spcPct val="100000"/>
               </a:lnSpc>
             </a:pPr>
-            <a:fld id="{31BA8E6F-F3EC-4625-9902-2DE855F614FD}" type="slidenum">
+            <a:fld id="{ED6CB2DF-E94C-48A3-BAD2-22F7D2F8712C}" type="slidenum">
               <a:rPr b="0" lang="pt-BR" sz="1400" spc="-1" strike="noStrike">
                 <a:solidFill>
                   <a:srgbClr val="b2b2b2"/>
@@ -5557,7 +5557,7 @@
                 <a:spcPct val="100000"/>
               </a:lnSpc>
             </a:pPr>
-            <a:fld id="{131AA171-D45E-499A-852A-D578A50EAD6B}" type="slidenum">
+            <a:fld id="{AC680C4A-D9B2-43B9-9055-CB84057E25F9}" type="slidenum">
               <a:rPr b="0" lang="pt-BR" sz="1400" spc="-1" strike="noStrike">
                 <a:solidFill>
                   <a:srgbClr val="b2b2b2"/>
@@ -5853,7 +5853,7 @@
                 <a:spcPct val="100000"/>
               </a:lnSpc>
             </a:pPr>
-            <a:fld id="{C5026A35-C4B8-42EA-BE0E-4F88BD349EB9}" type="slidenum">
+            <a:fld id="{4B69D32F-A6B9-4D01-AD3F-F78A40953AD9}" type="slidenum">
               <a:rPr b="0" lang="pt-BR" sz="1400" spc="-1" strike="noStrike">
                 <a:solidFill>
                   <a:srgbClr val="b2b2b2"/>

</xml_diff>